<commit_message>
/ ‘intro/IntroPresentation.pdf’ / ‘intro/IntroPresentation.pptx’
</commit_message>
<xml_diff>
--- a/intro/IntroPresentation.pptx
+++ b/intro/IntroPresentation.pptx
@@ -131,6 +131,22 @@
       </a:defRPr>
     </a:lvl9pPr>
   </p:defaultTextStyle>
+  <p:extLst>
+    <p:ext uri="{EFAFB233-063F-42B5-8137-9DF3F51BA10A}">
+      <p15:sldGuideLst xmlns:p15="http://schemas.microsoft.com/office/powerpoint/2012/main">
+        <p15:guide id="1" orient="horz" pos="2160">
+          <p15:clr>
+            <a:srgbClr val="A4A3A4"/>
+          </p15:clr>
+        </p15:guide>
+        <p15:guide id="2" pos="2880">
+          <p15:clr>
+            <a:srgbClr val="A4A3A4"/>
+          </p15:clr>
+        </p15:guide>
+      </p15:sldGuideLst>
+    </p:ext>
+  </p:extLst>
 </p:presentation>
 </file>
 
@@ -216,7 +232,7 @@
           <a:p>
             <a:fld id="{A65904DE-5373-004A-BC9C-B0A175A4A2D9}" type="datetimeFigureOut">
               <a:rPr lang="en-US" smtClean="0"/>
-              <a:t>5/29/16</a:t>
+              <a:t>5/21/17</a:t>
             </a:fld>
             <a:endParaRPr lang="en-US"/>
           </a:p>
@@ -756,7 +772,7 @@
           <a:p>
             <a:fld id="{C8A432C8-69A7-458B-9684-2BFA64B31948}" type="datetime2">
               <a:rPr lang="en-US" smtClean="0"/>
-              <a:t>Sunday, May 29, 16</a:t>
+              <a:t>Sunday, May 21, 2017</a:t>
             </a:fld>
             <a:endParaRPr lang="en-US"/>
           </a:p>
@@ -958,7 +974,7 @@
           <a:p>
             <a:fld id="{8CC057FC-95B6-4D89-AFDA-ABA33EE921E5}" type="datetime2">
               <a:rPr lang="en-US" smtClean="0"/>
-              <a:t>Sunday, May 29, 16</a:t>
+              <a:t>Sunday, May 21, 2017</a:t>
             </a:fld>
             <a:endParaRPr lang="en-US"/>
           </a:p>
@@ -1135,7 +1151,7 @@
           <a:p>
             <a:fld id="{EC4549AC-EB31-477F-92A9-B1988E232878}" type="datetime2">
               <a:rPr lang="en-US" smtClean="0"/>
-              <a:t>Sunday, May 29, 16</a:t>
+              <a:t>Sunday, May 21, 2017</a:t>
             </a:fld>
             <a:endParaRPr lang="en-US"/>
           </a:p>
@@ -1333,7 +1349,7 @@
           <a:p>
             <a:fld id="{6396A3A3-94A6-4E5B-AF39-173ACA3E61CC}" type="datetime2">
               <a:rPr lang="en-US" smtClean="0"/>
-              <a:t>Sunday, May 29, 16</a:t>
+              <a:t>Sunday, May 21, 2017</a:t>
             </a:fld>
             <a:endParaRPr lang="en-US"/>
           </a:p>
@@ -1583,7 +1599,7 @@
           <a:p>
             <a:fld id="{9933D019-A32C-4EAD-B8E6-DBDA699692FD}" type="datetime2">
               <a:rPr lang="en-US" smtClean="0"/>
-              <a:t>Sunday, May 29, 16</a:t>
+              <a:t>Sunday, May 21, 2017</a:t>
             </a:fld>
             <a:endParaRPr lang="en-US"/>
           </a:p>
@@ -1903,7 +1919,7 @@
           <a:p>
             <a:fld id="{CCEBA98F-560C-4997-81C4-81D4D9187EAB}" type="datetime2">
               <a:rPr lang="en-US" smtClean="0"/>
-              <a:t>Sunday, May 29, 16</a:t>
+              <a:t>Sunday, May 21, 2017</a:t>
             </a:fld>
             <a:endParaRPr lang="en-US"/>
           </a:p>
@@ -2371,7 +2387,7 @@
           <a:p>
             <a:fld id="{150972B2-CA5C-437D-87D0-8081271A9E4B}" type="datetime2">
               <a:rPr lang="en-US" smtClean="0"/>
-              <a:t>Sunday, May 29, 16</a:t>
+              <a:t>Sunday, May 21, 2017</a:t>
             </a:fld>
             <a:endParaRPr lang="en-US"/>
           </a:p>
@@ -2521,7 +2537,7 @@
           <a:p>
             <a:fld id="{79CD4847-11EF-4466-A8AD-85CDB7B49118}" type="datetime2">
               <a:rPr lang="en-US" smtClean="0"/>
-              <a:t>Sunday, May 29, 16</a:t>
+              <a:t>Sunday, May 21, 2017</a:t>
             </a:fld>
             <a:endParaRPr lang="en-US"/>
           </a:p>
@@ -2613,7 +2629,7 @@
           <a:p>
             <a:fld id="{F168457A-3AB9-4880-8A0C-9F8524491207}" type="datetime2">
               <a:rPr lang="en-US" smtClean="0"/>
-              <a:t>Sunday, May 29, 16</a:t>
+              <a:t>Sunday, May 21, 2017</a:t>
             </a:fld>
             <a:endParaRPr lang="en-US"/>
           </a:p>
@@ -2889,7 +2905,7 @@
           <a:p>
             <a:fld id="{3FE976D3-5B7F-4300-ABED-C91F1B2AE209}" type="datetime2">
               <a:rPr lang="en-US" smtClean="0"/>
-              <a:t>Sunday, May 29, 16</a:t>
+              <a:t>Sunday, May 21, 2017</a:t>
             </a:fld>
             <a:endParaRPr lang="en-US"/>
           </a:p>
@@ -3196,7 +3212,7 @@
           <a:p>
             <a:fld id="{EBDC1E59-17DD-41CE-97CA-624A472382D4}" type="datetime2">
               <a:rPr lang="en-US" smtClean="0"/>
-              <a:t>Sunday, May 29, 16</a:t>
+              <a:t>Sunday, May 21, 2017</a:t>
             </a:fld>
             <a:endParaRPr lang="en-US"/>
           </a:p>
@@ -3496,7 +3512,7 @@
           <a:p>
             <a:fld id="{A80CB818-7379-467D-8E76-EF9D9074A26C}" type="datetime2">
               <a:rPr lang="en-US" smtClean="0"/>
-              <a:t>Sunday, May 29, 16</a:t>
+              <a:t>Sunday, May 21, 2017</a:t>
             </a:fld>
             <a:endParaRPr lang="en-US" dirty="0"/>
           </a:p>
@@ -3943,7 +3959,7 @@
             </a:r>
             <a:r>
               <a:rPr lang="en-US" dirty="0" smtClean="0"/>
-              <a:t>2016</a:t>
+              <a:t>2017</a:t>
             </a:r>
             <a:r>
               <a:rPr lang="en-US" dirty="0" smtClean="0"/>
@@ -3954,7 +3970,11 @@
             </a:br>
             <a:r>
               <a:rPr lang="en-US" dirty="0" smtClean="0"/>
-              <a:t>Botswana</a:t>
+              <a:t>Nairobi, </a:t>
+            </a:r>
+            <a:r>
+              <a:rPr lang="en-US" dirty="0" err="1" smtClean="0"/>
+              <a:t>kenya</a:t>
             </a:r>
             <a:endParaRPr lang="en-US" dirty="0"/>
           </a:p>
@@ -3996,7 +4016,7 @@
   <p:timing>
     <p:tnLst>
       <p:par>
-        <p:cTn xmlns:p14="http://schemas.microsoft.com/office/powerpoint/2010/main" id="1" dur="indefinite" restart="never" nodeType="tmRoot"/>
+        <p:cTn id="1" dur="indefinite" restart="never" nodeType="tmRoot"/>
       </p:par>
     </p:tnLst>
   </p:timing>
@@ -4197,7 +4217,7 @@
   <p:timing>
     <p:tnLst>
       <p:par>
-        <p:cTn xmlns:p14="http://schemas.microsoft.com/office/powerpoint/2010/main" id="1" dur="indefinite" restart="never" nodeType="tmRoot"/>
+        <p:cTn id="1" dur="indefinite" restart="never" nodeType="tmRoot"/>
       </p:par>
     </p:tnLst>
   </p:timing>
@@ -4320,7 +4340,7 @@
   <p:timing>
     <p:tnLst>
       <p:par>
-        <p:cTn xmlns:p14="http://schemas.microsoft.com/office/powerpoint/2010/main" id="1" dur="indefinite" restart="never" nodeType="tmRoot"/>
+        <p:cTn id="1" dur="indefinite" restart="never" nodeType="tmRoot"/>
       </p:par>
     </p:tnLst>
   </p:timing>
@@ -4361,11 +4381,7 @@
           <a:p>
             <a:r>
               <a:rPr lang="en-US" dirty="0" smtClean="0"/>
-              <a:t>Online </a:t>
-            </a:r>
-            <a:r>
-              <a:rPr lang="en-US" dirty="0" smtClean="0"/>
-              <a:t>Resources</a:t>
+              <a:t>Online Resources</a:t>
             </a:r>
             <a:endParaRPr lang="en-US" dirty="0"/>
           </a:p>
@@ -4403,13 +4419,13 @@
               <a:rPr lang="en-US" sz="2600" dirty="0">
                 <a:hlinkClick r:id="rId2"/>
               </a:rPr>
-              <a:t>http://www.ws.afnog.org/</a:t>
+              <a:t>http://</a:t>
             </a:r>
             <a:r>
               <a:rPr lang="en-US" sz="2600" dirty="0" smtClean="0">
                 <a:hlinkClick r:id="rId2"/>
               </a:rPr>
-              <a:t>afnog2016/</a:t>
+              <a:t>www.ws.afnog.org/afnog2017/</a:t>
             </a:r>
             <a:endParaRPr lang="en-US" sz="2600" dirty="0"/>
           </a:p>
@@ -4507,7 +4523,7 @@
   <p:timing>
     <p:tnLst>
       <p:par>
-        <p:cTn xmlns:p14="http://schemas.microsoft.com/office/powerpoint/2010/main" id="1" dur="indefinite" restart="never" nodeType="tmRoot"/>
+        <p:cTn id="1" dur="indefinite" restart="never" nodeType="tmRoot"/>
       </p:par>
     </p:tnLst>
   </p:timing>
@@ -4630,7 +4646,7 @@
   <p:timing>
     <p:tnLst>
       <p:par>
-        <p:cTn xmlns:p14="http://schemas.microsoft.com/office/powerpoint/2010/main" id="1" dur="indefinite" restart="never" nodeType="tmRoot"/>
+        <p:cTn id="1" dur="indefinite" restart="never" nodeType="tmRoot"/>
       </p:par>
     </p:tnLst>
   </p:timing>
@@ -4758,17 +4774,12 @@
               <a:rPr lang="en-US" sz="2800" b="1" dirty="0" smtClean="0"/>
               <a:t>Hosting Web services</a:t>
             </a:r>
-            <a:endParaRPr lang="en-US" sz="2800" b="1" dirty="0" smtClean="0"/>
           </a:p>
           <a:p>
             <a:pPr lvl="1"/>
             <a:r>
               <a:rPr lang="en-US" dirty="0" smtClean="0"/>
-              <a:t>Web server </a:t>
-            </a:r>
-            <a:r>
-              <a:rPr lang="en-US" dirty="0" smtClean="0"/>
-              <a:t>using Apache</a:t>
+              <a:t>Web server using Apache</a:t>
             </a:r>
             <a:endParaRPr lang="en-US" dirty="0"/>
           </a:p>
@@ -4778,21 +4789,12 @@
               <a:rPr lang="en-US" sz="2800" b="1" dirty="0" smtClean="0"/>
               <a:t>RADIUS &amp; LDAP</a:t>
             </a:r>
-            <a:endParaRPr lang="en-US" sz="2800" b="1" dirty="0" smtClean="0"/>
           </a:p>
           <a:p>
             <a:pPr lvl="1"/>
             <a:r>
               <a:rPr lang="en-US" dirty="0" smtClean="0"/>
-              <a:t>For </a:t>
-            </a:r>
-            <a:r>
-              <a:rPr lang="en-US" dirty="0" smtClean="0"/>
-              <a:t>centralizing </a:t>
-            </a:r>
-            <a:r>
-              <a:rPr lang="en-US" dirty="0" smtClean="0"/>
-              <a:t>authentication</a:t>
+              <a:t>For centralizing authentication</a:t>
             </a:r>
             <a:endParaRPr lang="en-US" dirty="0"/>
           </a:p>
@@ -4802,17 +4804,12 @@
               <a:rPr lang="en-US" sz="2800" b="1" dirty="0" smtClean="0"/>
               <a:t>Virtualization</a:t>
             </a:r>
-            <a:endParaRPr lang="en-US" sz="2800" b="1" dirty="0" smtClean="0"/>
           </a:p>
           <a:p>
             <a:pPr lvl="1"/>
             <a:r>
               <a:rPr lang="en-US" dirty="0" smtClean="0"/>
-              <a:t>How to build virtual </a:t>
-            </a:r>
-            <a:r>
-              <a:rPr lang="en-US" dirty="0" smtClean="0"/>
-              <a:t>servers</a:t>
+              <a:t>How to build virtual servers</a:t>
             </a:r>
             <a:endParaRPr lang="en-US" dirty="0"/>
           </a:p>
@@ -4831,7 +4828,7 @@
   <p:timing>
     <p:tnLst>
       <p:par>
-        <p:cTn xmlns:p14="http://schemas.microsoft.com/office/powerpoint/2010/main" id="1" dur="indefinite" restart="never" nodeType="tmRoot"/>
+        <p:cTn id="1" dur="indefinite" restart="never" nodeType="tmRoot"/>
       </p:par>
     </p:tnLst>
   </p:timing>
@@ -4955,11 +4952,7 @@
             </a:r>
             <a:r>
               <a:rPr lang="en-US" dirty="0" smtClean="0"/>
-              <a:t>: </a:t>
-            </a:r>
-            <a:r>
-              <a:rPr lang="en-US" dirty="0" smtClean="0"/>
-              <a:t>DNS (Intro)</a:t>
+              <a:t>: DNS (Intro)</a:t>
             </a:r>
             <a:endParaRPr lang="en-US" dirty="0"/>
           </a:p>
@@ -4967,11 +4960,7 @@
             <a:pPr lvl="1"/>
             <a:r>
               <a:rPr lang="en-US" dirty="0" smtClean="0"/>
-              <a:t>Third Session: </a:t>
-            </a:r>
-            <a:r>
-              <a:rPr lang="en-US" dirty="0" smtClean="0"/>
-              <a:t>Firewalls and Network Security</a:t>
+              <a:t>Third Session: Firewalls and Network Security</a:t>
             </a:r>
             <a:endParaRPr lang="en-US" dirty="0"/>
           </a:p>
@@ -4987,11 +4976,7 @@
             </a:r>
             <a:r>
               <a:rPr lang="en-US" dirty="0" smtClean="0"/>
-              <a:t>: </a:t>
-            </a:r>
-            <a:r>
-              <a:rPr lang="en-US" dirty="0" smtClean="0"/>
-              <a:t>DNS (Resolver)</a:t>
+              <a:t>: DNS (Resolver)</a:t>
             </a:r>
           </a:p>
           <a:p>
@@ -5032,11 +5017,7 @@
             </a:r>
             <a:r>
               <a:rPr lang="en-US" dirty="0" smtClean="0"/>
-              <a:t>: </a:t>
-            </a:r>
-            <a:r>
-              <a:rPr lang="en-US" dirty="0" smtClean="0"/>
-              <a:t>Security (Public Key, SSL, PGP, Crypto)</a:t>
+              <a:t>: Security (Public Key, SSL, PGP, Crypto)</a:t>
             </a:r>
             <a:endParaRPr lang="en-US" dirty="0"/>
           </a:p>
@@ -5044,11 +5025,7 @@
             <a:pPr lvl="1"/>
             <a:r>
               <a:rPr lang="en-US" dirty="0" smtClean="0"/>
-              <a:t>Second </a:t>
-            </a:r>
-            <a:r>
-              <a:rPr lang="en-US" dirty="0" smtClean="0"/>
-              <a:t>: DNS (Authoritative)</a:t>
+              <a:t>Second : DNS (Authoritative)</a:t>
             </a:r>
             <a:endParaRPr lang="en-US" dirty="0"/>
           </a:p>
@@ -5056,19 +5033,7 @@
             <a:pPr lvl="1"/>
             <a:r>
               <a:rPr lang="en-US" dirty="0" smtClean="0"/>
-              <a:t>Third </a:t>
-            </a:r>
-            <a:r>
-              <a:rPr lang="en-US" dirty="0" smtClean="0"/>
-              <a:t>Session</a:t>
-            </a:r>
-            <a:r>
-              <a:rPr lang="en-US" dirty="0" smtClean="0"/>
-              <a:t>: </a:t>
-            </a:r>
-            <a:r>
-              <a:rPr lang="en-US" dirty="0" smtClean="0"/>
-              <a:t>Apache + PHP</a:t>
+              <a:t>Third Session: Apache + PHP</a:t>
             </a:r>
           </a:p>
           <a:p>
@@ -5127,11 +5092,7 @@
             </a:r>
             <a:r>
               <a:rPr lang="en-US" dirty="0" smtClean="0"/>
-              <a:t>: </a:t>
-            </a:r>
-            <a:r>
-              <a:rPr lang="en-US" dirty="0" smtClean="0"/>
-              <a:t>Postfix</a:t>
+              <a:t>: Postfix</a:t>
             </a:r>
             <a:endParaRPr lang="en-US" dirty="0"/>
           </a:p>
@@ -5139,11 +5100,7 @@
             <a:pPr lvl="1"/>
             <a:r>
               <a:rPr lang="en-US" dirty="0" smtClean="0"/>
-              <a:t>Third and Fourth Session: </a:t>
-            </a:r>
-            <a:r>
-              <a:rPr lang="en-US" dirty="0" smtClean="0"/>
-              <a:t>Open LDAP Directory</a:t>
+              <a:t>Third and Fourth Session: Open LDAP Directory</a:t>
             </a:r>
           </a:p>
           <a:p>
@@ -5185,7 +5142,7 @@
   <p:timing>
     <p:tnLst>
       <p:par>
-        <p:cTn xmlns:p14="http://schemas.microsoft.com/office/powerpoint/2010/main" id="1" dur="indefinite" restart="never" nodeType="tmRoot"/>
+        <p:cTn id="1" dur="indefinite" restart="never" nodeType="tmRoot"/>
       </p:par>
     </p:tnLst>
   </p:timing>
@@ -5231,11 +5188,7 @@
           <a:p>
             <a:r>
               <a:rPr lang="en-US" dirty="0" smtClean="0"/>
-              <a:t>Rough agenda for the </a:t>
-            </a:r>
-            <a:r>
-              <a:rPr lang="en-US" dirty="0" smtClean="0"/>
-              <a:t>week </a:t>
+              <a:t>Rough agenda for the week </a:t>
             </a:r>
             <a:r>
               <a:rPr lang="is-IS" dirty="0" smtClean="0"/>
@@ -5282,11 +5235,7 @@
             <a:pPr lvl="1"/>
             <a:r>
               <a:rPr lang="en-US" dirty="0" smtClean="0"/>
-              <a:t>First </a:t>
-            </a:r>
-            <a:r>
-              <a:rPr lang="en-US" dirty="0" smtClean="0"/>
-              <a:t>and Second Session: RADIUS</a:t>
+              <a:t>First and Second Session: RADIUS</a:t>
             </a:r>
             <a:endParaRPr lang="en-US" dirty="0"/>
           </a:p>
@@ -5302,11 +5251,7 @@
             </a:r>
             <a:r>
               <a:rPr lang="en-US" dirty="0" smtClean="0"/>
-              <a:t>: </a:t>
-            </a:r>
-            <a:r>
-              <a:rPr lang="en-US" dirty="0" smtClean="0"/>
-              <a:t>Dovecot IMAP</a:t>
+              <a:t>: Dovecot IMAP</a:t>
             </a:r>
             <a:endParaRPr lang="en-US" dirty="0"/>
           </a:p>
@@ -5314,11 +5259,7 @@
             <a:pPr lvl="1"/>
             <a:r>
               <a:rPr lang="en-US" dirty="0" smtClean="0"/>
-              <a:t>Fourth </a:t>
-            </a:r>
-            <a:r>
-              <a:rPr lang="en-US" dirty="0" smtClean="0"/>
-              <a:t>Session: </a:t>
+              <a:t>Fourth Session: </a:t>
             </a:r>
             <a:r>
               <a:rPr lang="en-US" dirty="0" err="1" smtClean="0"/>
@@ -5341,19 +5282,7 @@
             <a:pPr lvl="1"/>
             <a:r>
               <a:rPr lang="en-US" dirty="0" smtClean="0"/>
-              <a:t>First </a:t>
-            </a:r>
-            <a:r>
-              <a:rPr lang="en-US" dirty="0" smtClean="0"/>
-              <a:t>and Session</a:t>
-            </a:r>
-            <a:r>
-              <a:rPr lang="en-US" dirty="0" smtClean="0"/>
-              <a:t>: </a:t>
-            </a:r>
-            <a:r>
-              <a:rPr lang="en-US" dirty="0" smtClean="0"/>
-              <a:t>Load Balancing</a:t>
+              <a:t>First and Session: Load Balancing</a:t>
             </a:r>
             <a:endParaRPr lang="en-US" dirty="0"/>
           </a:p>
@@ -5388,7 +5317,7 @@
   <p:timing>
     <p:tnLst>
       <p:par>
-        <p:cTn xmlns:p14="http://schemas.microsoft.com/office/powerpoint/2010/main" id="1" dur="indefinite" restart="never" nodeType="tmRoot"/>
+        <p:cTn id="1" dur="indefinite" restart="never" nodeType="tmRoot"/>
       </p:par>
     </p:tnLst>
   </p:timing>
@@ -5453,7 +5382,7 @@
   <p:timing>
     <p:tnLst>
       <p:par>
-        <p:cTn xmlns:p14="http://schemas.microsoft.com/office/powerpoint/2010/main" id="1" dur="indefinite" restart="never" nodeType="tmRoot"/>
+        <p:cTn id="1" dur="indefinite" restart="never" nodeType="tmRoot"/>
       </p:par>
     </p:tnLst>
   </p:timing>
@@ -5563,15 +5492,23 @@
             </a:r>
             <a:r>
               <a:rPr lang="en-US" dirty="0"/>
-              <a:t>	afnog@debian8:</a:t>
-            </a:r>
-            <a:r>
-              <a:rPr lang="en-US" sz="2000" dirty="0"/>
-              <a:t>~</a:t>
+              <a:t>	</a:t>
+            </a:r>
+            <a:r>
+              <a:rPr lang="en-US" dirty="0"/>
+              <a:t> </a:t>
+            </a:r>
+            <a:r>
+              <a:rPr lang="en-US" dirty="0" err="1"/>
+              <a:t>afnog@pcX</a:t>
+            </a:r>
+            <a:r>
+              <a:rPr lang="en-US" dirty="0"/>
+              <a:t> :</a:t>
             </a:r>
             <a:r>
               <a:rPr lang="en-US" sz="2000" dirty="0" smtClean="0"/>
-              <a:t>$</a:t>
+              <a:t>~$</a:t>
             </a:r>
             <a:r>
               <a:rPr lang="en-US" b="1" dirty="0" err="1" smtClean="0"/>
@@ -5579,11 +5516,7 @@
             </a:r>
             <a:r>
               <a:rPr lang="en-US" b="1" dirty="0" smtClean="0"/>
-              <a:t> </a:t>
-            </a:r>
-            <a:r>
-              <a:rPr lang="en-US" b="1" dirty="0" smtClean="0"/>
-              <a:t>apt-get install </a:t>
+              <a:t> apt-get install </a:t>
             </a:r>
             <a:r>
               <a:rPr lang="en-US" b="1" dirty="0" err="1" smtClean="0"/>
@@ -5614,15 +5547,19 @@
               <a:t>	</a:t>
             </a:r>
             <a:r>
-              <a:rPr lang="en-US" dirty="0" smtClean="0"/>
-              <a:t>afnog</a:t>
+              <a:rPr lang="en-US" dirty="0" err="1" smtClean="0"/>
+              <a:t>afnog@pcX</a:t>
+            </a:r>
+            <a:r>
+              <a:rPr lang="en-US" dirty="0" smtClean="0"/>
+              <a:t> </a:t>
             </a:r>
             <a:r>
               <a:rPr lang="en-US" dirty="0"/>
-              <a:t>@debian8:</a:t>
-            </a:r>
-            <a:r>
-              <a:rPr lang="en-US" sz="2000" dirty="0"/>
+              <a:t>:</a:t>
+            </a:r>
+            <a:r>
+              <a:rPr lang="en-US" sz="2000" dirty="0" smtClean="0"/>
               <a:t>~$</a:t>
             </a:r>
             <a:r>
@@ -5631,11 +5568,7 @@
             </a:r>
             <a:r>
               <a:rPr lang="en-US" b="1" dirty="0" smtClean="0"/>
-              <a:t> </a:t>
-            </a:r>
-            <a:r>
-              <a:rPr lang="en-US" b="1" dirty="0" smtClean="0"/>
-              <a:t>/path/to/filename</a:t>
+              <a:t> /path/to/filename</a:t>
             </a:r>
             <a:br>
               <a:rPr lang="en-US" b="1" dirty="0" smtClean="0"/>
@@ -5646,18 +5579,26 @@
             </a:r>
             <a:r>
               <a:rPr lang="en-US" b="1" dirty="0" smtClean="0"/>
-              <a:t>        </a:t>
-            </a:r>
-            <a:r>
-              <a:rPr lang="en-US" dirty="0" smtClean="0"/>
-              <a:t>afnog</a:t>
+              <a:t> </a:t>
+            </a:r>
+            <a:r>
+              <a:rPr lang="en-US" b="1" dirty="0" smtClean="0"/>
+              <a:t>	</a:t>
+            </a:r>
+            <a:r>
+              <a:rPr lang="en-US" dirty="0" err="1" smtClean="0"/>
+              <a:t>afnog@pcX</a:t>
+            </a:r>
+            <a:r>
+              <a:rPr lang="en-US" dirty="0" smtClean="0"/>
+              <a:t> </a:t>
             </a:r>
             <a:r>
               <a:rPr lang="en-US" dirty="0"/>
-              <a:t>@debian8:</a:t>
-            </a:r>
-            <a:r>
-              <a:rPr lang="en-US" sz="2000" dirty="0"/>
+              <a:t>:</a:t>
+            </a:r>
+            <a:r>
+              <a:rPr lang="en-US" sz="2000" dirty="0" smtClean="0"/>
               <a:t>~$</a:t>
             </a:r>
             <a:r>
@@ -5666,11 +5607,7 @@
             </a:r>
             <a:r>
               <a:rPr lang="en-US" b="1" dirty="0" smtClean="0"/>
-              <a:t> </a:t>
-            </a:r>
-            <a:r>
-              <a:rPr lang="en-US" b="1" dirty="0" smtClean="0"/>
-              <a:t>filename</a:t>
+              <a:t> filename</a:t>
             </a:r>
           </a:p>
           <a:p>
@@ -5749,7 +5686,7 @@
   <p:timing>
     <p:tnLst>
       <p:par>
-        <p:cTn xmlns:p14="http://schemas.microsoft.com/office/powerpoint/2010/main" id="1" dur="indefinite" restart="never" nodeType="tmRoot"/>
+        <p:cTn id="1" dur="indefinite" restart="never" nodeType="tmRoot"/>
       </p:par>
     </p:tnLst>
   </p:timing>
@@ -5816,7 +5753,7 @@
         </p:nvSpPr>
         <p:spPr>
           <a:xfrm>
-            <a:off x="457200" y="1600199"/>
+            <a:off x="457200" y="1627495"/>
             <a:ext cx="8446968" cy="5073727"/>
           </a:xfrm>
         </p:spPr>
@@ -5837,23 +5774,27 @@
             </a:pPr>
             <a:r>
               <a:rPr lang="en-US" sz="2600" dirty="0"/>
-              <a:t>	afnog@debian8:</a:t>
-            </a:r>
-            <a:r>
-              <a:rPr lang="en-US" sz="2300" dirty="0"/>
-              <a:t>~</a:t>
+              <a:t>	</a:t>
+            </a:r>
+            <a:r>
+              <a:rPr lang="en-US" sz="2600" dirty="0"/>
+              <a:t> </a:t>
+            </a:r>
+            <a:r>
+              <a:rPr lang="en-US" sz="2600" dirty="0" err="1"/>
+              <a:t>afnog@pcX</a:t>
+            </a:r>
+            <a:r>
+              <a:rPr lang="en-US" sz="2600" dirty="0"/>
+              <a:t> :</a:t>
             </a:r>
             <a:r>
               <a:rPr lang="en-US" sz="2300" dirty="0" smtClean="0"/>
-              <a:t>$</a:t>
+              <a:t>~$</a:t>
             </a:r>
             <a:r>
               <a:rPr lang="en-US" sz="2400" b="1" dirty="0" smtClean="0"/>
-              <a:t>cd </a:t>
-            </a:r>
-            <a:r>
-              <a:rPr lang="en-US" sz="2400" b="1" dirty="0" smtClean="0"/>
-              <a:t>/home/</a:t>
+              <a:t>cd /home/</a:t>
             </a:r>
             <a:r>
               <a:rPr lang="en-US" sz="2400" b="1" dirty="0" err="1" smtClean="0"/>
@@ -5864,19 +5805,7 @@
           <a:p>
             <a:r>
               <a:rPr lang="en-US" dirty="0" smtClean="0"/>
-              <a:t>Open </a:t>
-            </a:r>
-            <a:r>
-              <a:rPr lang="en-US" dirty="0" smtClean="0"/>
-              <a:t>a </a:t>
-            </a:r>
-            <a:r>
-              <a:rPr lang="en-US" dirty="0" smtClean="0"/>
-              <a:t>file:</a:t>
-            </a:r>
-            <a:r>
-              <a:rPr lang="en-US" dirty="0" smtClean="0"/>
-              <a:t/>
+              <a:t>Open a file:</a:t>
             </a:r>
             <a:br>
               <a:rPr lang="en-US" dirty="0" smtClean="0"/>
@@ -5886,16 +5815,16 @@
               <a:t>	</a:t>
             </a:r>
             <a:r>
-              <a:rPr lang="en-US" sz="2600" dirty="0" smtClean="0"/>
-              <a:t>afnog</a:t>
-            </a:r>
-            <a:r>
               <a:rPr lang="en-US" sz="2600" dirty="0"/>
-              <a:t>@debian8:~</a:t>
-            </a:r>
-            <a:r>
-              <a:rPr lang="en-US" sz="2600" dirty="0" smtClean="0"/>
-              <a:t>$</a:t>
+              <a:t> </a:t>
+            </a:r>
+            <a:r>
+              <a:rPr lang="en-US" sz="2600" dirty="0" err="1"/>
+              <a:t>afnog@pcX</a:t>
+            </a:r>
+            <a:r>
+              <a:rPr lang="en-US" sz="2600" dirty="0"/>
+              <a:t> :~$</a:t>
             </a:r>
             <a:r>
               <a:rPr lang="en-US" b="1" dirty="0" err="1" smtClean="0"/>
@@ -5979,13 +5908,10 @@
               <a:t> SSE </a:t>
             </a:r>
             <a:r>
-              <a:rPr lang="en-US" b="1" dirty="0"/>
-              <a:t>2016</a:t>
-            </a:r>
-            <a:r>
               <a:rPr lang="en-US" b="1" dirty="0" smtClean="0"/>
-              <a:t>!”</a:t>
-            </a:r>
+              <a:t>2017!”</a:t>
+            </a:r>
+            <a:endParaRPr lang="en-US" b="1" dirty="0" smtClean="0"/>
           </a:p>
           <a:p>
             <a:pPr marL="0" indent="0">
@@ -6017,11 +5943,7 @@
           <a:p>
             <a:r>
               <a:rPr lang="en-US" dirty="0" smtClean="0"/>
-              <a:t>Then </a:t>
-            </a:r>
-            <a:r>
-              <a:rPr lang="en-US" dirty="0" smtClean="0"/>
-              <a:t>Save and Exit</a:t>
+              <a:t>Then Save and Exit</a:t>
             </a:r>
           </a:p>
           <a:p>
@@ -6034,11 +5956,7 @@
             </a:r>
             <a:r>
               <a:rPr lang="en-US" b="1" dirty="0" smtClean="0"/>
-              <a:t>Ctrl </a:t>
-            </a:r>
-            <a:r>
-              <a:rPr lang="en-US" b="1" dirty="0" smtClean="0"/>
-              <a:t>X</a:t>
+              <a:t>Ctrl X</a:t>
             </a:r>
             <a:r>
               <a:rPr lang="en-US" dirty="0"/>
@@ -6046,15 +5964,7 @@
             </a:r>
             <a:r>
               <a:rPr lang="en-US" dirty="0" smtClean="0"/>
-              <a:t>and </a:t>
-            </a:r>
-            <a:r>
-              <a:rPr lang="en-US" dirty="0" smtClean="0"/>
-              <a:t>Then </a:t>
-            </a:r>
-            <a:r>
-              <a:rPr lang="en-US" dirty="0" smtClean="0"/>
-              <a:t>answer </a:t>
+              <a:t>and Then answer </a:t>
             </a:r>
             <a:r>
               <a:rPr lang="en-US" b="1" dirty="0" smtClean="0"/>
@@ -6066,11 +5976,7 @@
             </a:r>
             <a:r>
               <a:rPr lang="en-US" b="1" dirty="0" smtClean="0"/>
-              <a:t>Maintain the same filename (</a:t>
-            </a:r>
-            <a:r>
-              <a:rPr lang="en-US" b="1" dirty="0" smtClean="0"/>
-              <a:t>press enter)</a:t>
+              <a:t>Maintain the same filename (press enter)</a:t>
             </a:r>
           </a:p>
           <a:p>
@@ -6092,11 +5998,19 @@
             </a:pPr>
             <a:r>
               <a:rPr lang="en-US" dirty="0"/>
-              <a:t>	afnog@debian8:~</a:t>
-            </a:r>
-            <a:r>
-              <a:rPr lang="en-US" dirty="0" smtClean="0"/>
-              <a:t>$ </a:t>
+              <a:t>	</a:t>
+            </a:r>
+            <a:r>
+              <a:rPr lang="en-US" dirty="0"/>
+              <a:t> </a:t>
+            </a:r>
+            <a:r>
+              <a:rPr lang="en-US" dirty="0" err="1"/>
+              <a:t>afnog@pcX</a:t>
+            </a:r>
+            <a:r>
+              <a:rPr lang="en-US" dirty="0"/>
+              <a:t> :~$ </a:t>
             </a:r>
             <a:r>
               <a:rPr lang="en-US" b="1" dirty="0" err="1" smtClean="0"/>
@@ -6131,7 +6045,19 @@
             </a:pPr>
             <a:r>
               <a:rPr lang="en-US" dirty="0"/>
-              <a:t>	afnog@debian8:~$ </a:t>
+              <a:t>	</a:t>
+            </a:r>
+            <a:r>
+              <a:rPr lang="en-US" dirty="0"/>
+              <a:t> </a:t>
+            </a:r>
+            <a:r>
+              <a:rPr lang="en-US" dirty="0" err="1"/>
+              <a:t>afnog@pcX</a:t>
+            </a:r>
+            <a:r>
+              <a:rPr lang="en-US" dirty="0"/>
+              <a:t> :~$ </a:t>
             </a:r>
             <a:r>
               <a:rPr lang="en-US" b="1" dirty="0" smtClean="0"/>
@@ -6162,7 +6088,7 @@
   <p:timing>
     <p:tnLst>
       <p:par>
-        <p:cTn xmlns:p14="http://schemas.microsoft.com/office/powerpoint/2010/main" id="1" dur="indefinite" restart="never" nodeType="tmRoot"/>
+        <p:cTn id="1" dur="indefinite" restart="never" nodeType="tmRoot"/>
       </p:par>
     </p:tnLst>
   </p:timing>
@@ -6247,7 +6173,15 @@
             <a:pPr lvl="1"/>
             <a:r>
               <a:rPr lang="en-US" dirty="0" smtClean="0"/>
-              <a:t>DNS, Web Email</a:t>
+              <a:t>DNS, </a:t>
+            </a:r>
+            <a:r>
+              <a:rPr lang="en-US" dirty="0" smtClean="0"/>
+              <a:t>Web, </a:t>
+            </a:r>
+            <a:r>
+              <a:rPr lang="en-US" dirty="0" smtClean="0"/>
+              <a:t>Email</a:t>
             </a:r>
           </a:p>
           <a:p>
@@ -6261,8 +6195,9 @@
             <a:pPr lvl="1"/>
             <a:r>
               <a:rPr lang="en-US" dirty="0" smtClean="0"/>
-              <a:t>Many others</a:t>
-            </a:r>
+              <a:t>Many Others</a:t>
+            </a:r>
+            <a:endParaRPr lang="en-US" dirty="0" smtClean="0"/>
           </a:p>
           <a:p>
             <a:r>
@@ -6285,7 +6220,7 @@
   <p:timing>
     <p:tnLst>
       <p:par>
-        <p:cTn xmlns:p14="http://schemas.microsoft.com/office/powerpoint/2010/main" id="1" dur="indefinite" restart="never" nodeType="tmRoot"/>
+        <p:cTn id="1" dur="indefinite" restart="never" nodeType="tmRoot"/>
       </p:par>
     </p:tnLst>
   </p:timing>
@@ -6428,7 +6363,7 @@
   <p:timing>
     <p:tnLst>
       <p:par>
-        <p:cTn xmlns:p14="http://schemas.microsoft.com/office/powerpoint/2010/main" id="1" dur="indefinite" restart="never" nodeType="tmRoot"/>
+        <p:cTn id="1" dur="indefinite" restart="never" nodeType="tmRoot"/>
       </p:par>
     </p:tnLst>
   </p:timing>
@@ -6507,7 +6442,7 @@
   <p:timing>
     <p:tnLst>
       <p:par>
-        <p:cTn xmlns:p14="http://schemas.microsoft.com/office/powerpoint/2010/main" id="1" dur="indefinite" restart="never" nodeType="tmRoot"/>
+        <p:cTn id="1" dur="indefinite" restart="never" nodeType="tmRoot"/>
       </p:par>
     </p:tnLst>
   </p:timing>
@@ -6586,15 +6521,15 @@
               <a:buNone/>
             </a:pPr>
             <a:r>
-              <a:rPr lang="en-US" dirty="0" smtClean="0"/>
-              <a:t>afnog</a:t>
+              <a:rPr lang="en-US" dirty="0" err="1"/>
+              <a:t>afnog@pcX</a:t>
             </a:r>
             <a:r>
               <a:rPr lang="en-US" dirty="0"/>
-              <a:t>@debian8:</a:t>
-            </a:r>
-            <a:r>
-              <a:rPr lang="en-US" sz="1800" dirty="0"/>
+              <a:t> :</a:t>
+            </a:r>
+            <a:r>
+              <a:rPr lang="en-US" sz="1800" dirty="0" smtClean="0"/>
               <a:t>~$</a:t>
             </a:r>
             <a:r>
@@ -6731,26 +6666,36 @@
                   <a:srgbClr val="292934"/>
                 </a:solidFill>
               </a:rPr>
-              <a:t>deb http://</a:t>
-            </a:r>
-            <a:r>
-              <a:rPr lang="en-US" b="1" dirty="0" err="1">
+              <a:t>deb </a:t>
+            </a:r>
+            <a:r>
+              <a:rPr lang="en-US" b="1" dirty="0">
+                <a:solidFill>
+                  <a:srgbClr val="292934"/>
+                </a:solidFill>
+                <a:hlinkClick r:id="rId2"/>
+              </a:rPr>
+              <a:t>http://</a:t>
+            </a:r>
+            <a:r>
+              <a:rPr lang="en-US" b="1" dirty="0" smtClean="0">
+                <a:solidFill>
+                  <a:srgbClr val="292934"/>
+                </a:solidFill>
+                <a:hlinkClick r:id="rId2"/>
+              </a:rPr>
+              <a:t>security.debian.org/</a:t>
+            </a:r>
+            <a:r>
+              <a:rPr lang="en-US" b="1" dirty="0" smtClean="0">
                 <a:solidFill>
                   <a:srgbClr val="292934"/>
                 </a:solidFill>
               </a:rPr>
-              <a:t>security.debian.org</a:t>
-            </a:r>
-            <a:r>
-              <a:rPr lang="en-US" b="1" dirty="0">
-                <a:solidFill>
-                  <a:srgbClr val="292934"/>
-                </a:solidFill>
-              </a:rPr>
-              <a:t>/ </a:t>
-            </a:r>
-            <a:r>
-              <a:rPr lang="en-US" b="1" dirty="0" err="1">
+              <a:t> </a:t>
+            </a:r>
+            <a:r>
+              <a:rPr lang="en-US" b="1" dirty="0" err="1" smtClean="0">
                 <a:solidFill>
                   <a:srgbClr val="292934"/>
                 </a:solidFill>
@@ -6758,7 +6703,7 @@
               <a:t>jessie</a:t>
             </a:r>
             <a:r>
-              <a:rPr lang="en-US" b="1" dirty="0">
+              <a:rPr lang="en-US" b="1" dirty="0" smtClean="0">
                 <a:solidFill>
                   <a:srgbClr val="292934"/>
                 </a:solidFill>
@@ -6971,7 +6916,7 @@
   <p:timing>
     <p:tnLst>
       <p:par>
-        <p:cTn xmlns:p14="http://schemas.microsoft.com/office/powerpoint/2010/main" id="1" dur="indefinite" restart="never" nodeType="tmRoot"/>
+        <p:cTn id="1" dur="indefinite" restart="never" nodeType="tmRoot"/>
       </p:par>
     </p:tnLst>
   </p:timing>
@@ -7049,15 +6994,15 @@
               <a:buNone/>
             </a:pPr>
             <a:r>
-              <a:rPr lang="en-US" dirty="0" smtClean="0"/>
-              <a:t>afnog</a:t>
-            </a:r>
-            <a:r>
-              <a:rPr lang="en-US" dirty="0"/>
-              <a:t>@debian8:</a:t>
-            </a:r>
-            <a:r>
-              <a:rPr lang="en-US" sz="1800" dirty="0"/>
+              <a:rPr lang="en-US" dirty="0" err="1" smtClean="0"/>
+              <a:t>afnog@pcX</a:t>
+            </a:r>
+            <a:r>
+              <a:rPr lang="en-US" dirty="0" smtClean="0"/>
+              <a:t>:</a:t>
+            </a:r>
+            <a:r>
+              <a:rPr lang="en-US" sz="1800" dirty="0" smtClean="0"/>
               <a:t>~$</a:t>
             </a:r>
             <a:r>
@@ -7074,15 +7019,15 @@
               <a:buNone/>
             </a:pPr>
             <a:r>
-              <a:rPr lang="en-US" dirty="0" smtClean="0"/>
-              <a:t>afnog</a:t>
-            </a:r>
-            <a:r>
-              <a:rPr lang="en-US" dirty="0"/>
-              <a:t>@debian8:</a:t>
-            </a:r>
-            <a:r>
-              <a:rPr lang="en-US" sz="1800" dirty="0"/>
+              <a:rPr lang="en-US" dirty="0" err="1" smtClean="0"/>
+              <a:t>afnog@pcX</a:t>
+            </a:r>
+            <a:r>
+              <a:rPr lang="en-US" dirty="0" smtClean="0"/>
+              <a:t>:</a:t>
+            </a:r>
+            <a:r>
+              <a:rPr lang="en-US" sz="1800" dirty="0" smtClean="0"/>
               <a:t>~$</a:t>
             </a:r>
             <a:r>
@@ -7110,15 +7055,15 @@
               <a:buNone/>
             </a:pPr>
             <a:r>
-              <a:rPr lang="en-US" dirty="0" smtClean="0"/>
-              <a:t>afnog</a:t>
-            </a:r>
-            <a:r>
-              <a:rPr lang="en-US" dirty="0"/>
-              <a:t>@debian8:</a:t>
-            </a:r>
-            <a:r>
-              <a:rPr lang="en-US" sz="1800" dirty="0"/>
+              <a:rPr lang="en-US" dirty="0" err="1" smtClean="0"/>
+              <a:t>afnog@pcX</a:t>
+            </a:r>
+            <a:r>
+              <a:rPr lang="en-US" dirty="0" smtClean="0"/>
+              <a:t>:</a:t>
+            </a:r>
+            <a:r>
+              <a:rPr lang="en-US" sz="1800" dirty="0" smtClean="0"/>
               <a:t>~$</a:t>
             </a:r>
             <a:r>
@@ -7160,15 +7105,15 @@
               <a:buNone/>
             </a:pPr>
             <a:r>
-              <a:rPr lang="en-US" dirty="0" smtClean="0"/>
-              <a:t>afnog</a:t>
+              <a:rPr lang="en-US" dirty="0" err="1"/>
+              <a:t>afnog@pcX</a:t>
             </a:r>
             <a:r>
               <a:rPr lang="en-US" dirty="0"/>
-              <a:t>@debian8:</a:t>
-            </a:r>
-            <a:r>
-              <a:rPr lang="en-US" sz="1800" dirty="0"/>
+              <a:t> :</a:t>
+            </a:r>
+            <a:r>
+              <a:rPr lang="en-US" sz="1800" dirty="0" smtClean="0"/>
               <a:t>~$</a:t>
             </a:r>
             <a:r>
@@ -7185,15 +7130,15 @@
               <a:buNone/>
             </a:pPr>
             <a:r>
-              <a:rPr lang="en-US" dirty="0" smtClean="0"/>
-              <a:t>afnog</a:t>
+              <a:rPr lang="en-US" dirty="0" err="1"/>
+              <a:t>afnog@pcX</a:t>
             </a:r>
             <a:r>
               <a:rPr lang="en-US" dirty="0"/>
-              <a:t>@debian8:</a:t>
-            </a:r>
-            <a:r>
-              <a:rPr lang="en-US" sz="1800" dirty="0"/>
+              <a:t> :</a:t>
+            </a:r>
+            <a:r>
+              <a:rPr lang="en-US" sz="1800" dirty="0" smtClean="0"/>
               <a:t>~$</a:t>
             </a:r>
             <a:r>
@@ -7226,15 +7171,15 @@
               <a:buNone/>
             </a:pPr>
             <a:r>
-              <a:rPr lang="en-US" dirty="0" smtClean="0"/>
-              <a:t>afnog</a:t>
+              <a:rPr lang="en-US" dirty="0" err="1"/>
+              <a:t>afnog@pcX</a:t>
             </a:r>
             <a:r>
               <a:rPr lang="en-US" dirty="0"/>
-              <a:t>@debian8:</a:t>
-            </a:r>
-            <a:r>
-              <a:rPr lang="en-US" sz="1800" dirty="0"/>
+              <a:t> :</a:t>
+            </a:r>
+            <a:r>
+              <a:rPr lang="en-US" sz="1800" dirty="0" smtClean="0"/>
               <a:t>~$</a:t>
             </a:r>
             <a:r>
@@ -7274,7 +7219,7 @@
   <p:timing>
     <p:tnLst>
       <p:par>
-        <p:cTn xmlns:p14="http://schemas.microsoft.com/office/powerpoint/2010/main" id="1" dur="indefinite" restart="never" nodeType="tmRoot"/>
+        <p:cTn id="1" dur="indefinite" restart="never" nodeType="tmRoot"/>
       </p:par>
     </p:tnLst>
   </p:timing>
@@ -7761,7 +7706,7 @@
   <p:timing>
     <p:tnLst>
       <p:par>
-        <p:cTn xmlns:p14="http://schemas.microsoft.com/office/powerpoint/2010/main" id="1" dur="indefinite" restart="never" nodeType="tmRoot"/>
+        <p:cTn id="1" dur="indefinite" restart="never" nodeType="tmRoot"/>
       </p:par>
     </p:tnLst>
   </p:timing>
@@ -7849,7 +7794,7 @@
   <p:timing>
     <p:tnLst>
       <p:par>
-        <p:cTn xmlns:p14="http://schemas.microsoft.com/office/powerpoint/2010/main" id="1" dur="indefinite" restart="never" nodeType="tmRoot"/>
+        <p:cTn id="1" dur="indefinite" restart="never" nodeType="tmRoot"/>
       </p:par>
     </p:tnLst>
   </p:timing>
@@ -7930,34 +7875,6 @@
           </a:p>
           <a:p>
             <a:r>
-              <a:rPr lang="en-US" dirty="0"/>
-              <a:t>Chris Wilson – </a:t>
-            </a:r>
-            <a:r>
-              <a:rPr lang="en-US" dirty="0" smtClean="0"/>
-              <a:t>UK</a:t>
-            </a:r>
-          </a:p>
-          <a:p>
-            <a:r>
-              <a:rPr lang="en-US" dirty="0" smtClean="0"/>
-              <a:t>Emmanuel </a:t>
-            </a:r>
-            <a:r>
-              <a:rPr lang="en-US" dirty="0" err="1"/>
-              <a:t>Odoom</a:t>
-            </a:r>
-            <a:r>
-              <a:rPr lang="en-US" dirty="0"/>
-              <a:t> - </a:t>
-            </a:r>
-            <a:r>
-              <a:rPr lang="en-US" dirty="0" smtClean="0"/>
-              <a:t>Ghana</a:t>
-            </a:r>
-          </a:p>
-          <a:p>
-            <a:r>
               <a:rPr lang="en-US" dirty="0" smtClean="0"/>
               <a:t>Frank </a:t>
             </a:r>
@@ -7977,6 +7894,29 @@
           <a:p>
             <a:r>
               <a:rPr lang="en-US" dirty="0" smtClean="0"/>
+              <a:t>Isabella </a:t>
+            </a:r>
+            <a:r>
+              <a:rPr lang="en-US" dirty="0" err="1" smtClean="0"/>
+              <a:t>Odida</a:t>
+            </a:r>
+            <a:r>
+              <a:rPr lang="en-US" dirty="0" smtClean="0"/>
+              <a:t> </a:t>
+            </a:r>
+            <a:r>
+              <a:rPr lang="mr-IN" dirty="0" smtClean="0"/>
+              <a:t>–</a:t>
+            </a:r>
+            <a:r>
+              <a:rPr lang="en-US" dirty="0" smtClean="0"/>
+              <a:t> Uganda </a:t>
+            </a:r>
+            <a:endParaRPr lang="en-US" dirty="0" smtClean="0"/>
+          </a:p>
+          <a:p>
+            <a:r>
+              <a:rPr lang="en-US" dirty="0" smtClean="0"/>
               <a:t>Joe </a:t>
             </a:r>
             <a:r>
@@ -7985,24 +7925,14 @@
             </a:r>
             <a:r>
               <a:rPr lang="en-US" dirty="0" smtClean="0"/>
-              <a:t> – </a:t>
-            </a:r>
-            <a:r>
-              <a:rPr lang="en-US" dirty="0" smtClean="0"/>
-              <a:t>Canada</a:t>
-            </a:r>
-            <a:endParaRPr lang="en-US" dirty="0" smtClean="0"/>
-          </a:p>
-          <a:p>
-            <a:r>
-              <a:rPr lang="en-US" dirty="0" smtClean="0"/>
-              <a:t>Kevin Chege – </a:t>
-            </a:r>
-            <a:r>
-              <a:rPr lang="en-US" dirty="0" smtClean="0"/>
-              <a:t>Kenya</a:t>
-            </a:r>
-            <a:endParaRPr lang="en-US" dirty="0" smtClean="0"/>
+              <a:t> – Canada</a:t>
+            </a:r>
+          </a:p>
+          <a:p>
+            <a:r>
+              <a:rPr lang="en-US" dirty="0" smtClean="0"/>
+              <a:t>Kevin Chege – Kenya</a:t>
+            </a:r>
           </a:p>
           <a:p>
             <a:r>
@@ -8032,7 +7962,7 @@
   <p:timing>
     <p:tnLst>
       <p:par>
-        <p:cTn xmlns:p14="http://schemas.microsoft.com/office/powerpoint/2010/main" id="1" dur="indefinite" restart="never" nodeType="tmRoot"/>
+        <p:cTn id="1" dur="indefinite" restart="never" nodeType="tmRoot"/>
       </p:par>
     </p:tnLst>
   </p:timing>
@@ -8143,13 +8073,7 @@
               <a:rPr lang="en-US" sz="2800" b="1" dirty="0" smtClean="0">
                 <a:sym typeface="Wingdings"/>
               </a:rPr>
-              <a:t>Botswana</a:t>
-            </a:r>
-            <a:r>
-              <a:rPr lang="en-US" sz="2800" b="1" dirty="0" smtClean="0">
-                <a:sym typeface="Wingdings"/>
-              </a:rPr>
-              <a:t>?</a:t>
+              <a:t>Nairobi?</a:t>
             </a:r>
             <a:endParaRPr lang="en-US" sz="2800" b="1" dirty="0" smtClean="0">
               <a:sym typeface="Wingdings"/>
@@ -8173,7 +8097,7 @@
   <p:timing>
     <p:tnLst>
       <p:par>
-        <p:cTn xmlns:p14="http://schemas.microsoft.com/office/powerpoint/2010/main" id="1" dur="indefinite" restart="never" nodeType="tmRoot"/>
+        <p:cTn id="1" dur="indefinite" restart="never" nodeType="tmRoot"/>
       </p:par>
     </p:tnLst>
   </p:timing>
@@ -8251,7 +8175,15 @@
             </a:r>
             <a:r>
               <a:rPr lang="en-US" sz="2800" dirty="0" smtClean="0"/>
-              <a:t> 8.0.0 (Jessie) that </a:t>
+              <a:t> </a:t>
+            </a:r>
+            <a:r>
+              <a:rPr lang="en-US" sz="2800" dirty="0" smtClean="0"/>
+              <a:t>8.8 </a:t>
+            </a:r>
+            <a:r>
+              <a:rPr lang="en-US" sz="2800" dirty="0" smtClean="0"/>
+              <a:t>(Jessie) that </a:t>
             </a:r>
             <a:r>
               <a:rPr lang="en-US" sz="2800" b="1" dirty="0" smtClean="0"/>
@@ -8299,19 +8231,7 @@
               <a:rPr lang="en-US" sz="2800" dirty="0" smtClean="0">
                 <a:sym typeface="Wingdings"/>
               </a:rPr>
-              <a:t>Please </a:t>
-            </a:r>
-            <a:r>
-              <a:rPr lang="en-US" sz="2800" dirty="0" smtClean="0">
-                <a:sym typeface="Wingdings"/>
-              </a:rPr>
-              <a:t>pay </a:t>
-            </a:r>
-            <a:r>
-              <a:rPr lang="en-US" sz="2800" dirty="0" smtClean="0">
-                <a:sym typeface="Wingdings"/>
-              </a:rPr>
-              <a:t>during theory sessions   </a:t>
+              <a:t>Please pay during theory sessions   </a:t>
             </a:r>
             <a:endParaRPr lang="en-US" sz="2800" dirty="0" smtClean="0"/>
           </a:p>
@@ -8339,7 +8259,7 @@
   <p:timing>
     <p:tnLst>
       <p:par>
-        <p:cTn xmlns:p14="http://schemas.microsoft.com/office/powerpoint/2010/main" id="1" dur="indefinite" restart="never" nodeType="tmRoot"/>
+        <p:cTn id="1" dur="indefinite" restart="never" nodeType="tmRoot"/>
       </p:par>
     </p:tnLst>
   </p:timing>
@@ -8405,18 +8325,22 @@
         <p:spPr/>
         <p:txBody>
           <a:bodyPr>
-            <a:normAutofit fontScale="77500" lnSpcReduction="20000"/>
+            <a:normAutofit fontScale="85000" lnSpcReduction="20000"/>
           </a:bodyPr>
           <a:lstStyle/>
           <a:p>
             <a:pPr lvl="1"/>
             <a:r>
               <a:rPr lang="en-US" dirty="0" smtClean="0"/>
-              <a:t>Breakfast starts at </a:t>
-            </a:r>
-            <a:r>
-              <a:rPr lang="en-US" dirty="0" smtClean="0"/>
-              <a:t>6am*</a:t>
+              <a:t>Breakfast </a:t>
+            </a:r>
+            <a:r>
+              <a:rPr lang="en-US" dirty="0" smtClean="0"/>
+              <a:t>at the hotel starts </a:t>
+            </a:r>
+            <a:r>
+              <a:rPr lang="en-US" dirty="0" smtClean="0"/>
+              <a:t>at 6am*</a:t>
             </a:r>
             <a:endParaRPr lang="en-US" b="1" dirty="0" smtClean="0"/>
           </a:p>
@@ -8430,141 +8354,47 @@
             <a:pPr lvl="1"/>
             <a:r>
               <a:rPr lang="en-US" dirty="0" smtClean="0"/>
-              <a:t>Tea </a:t>
-            </a:r>
-            <a:r>
-              <a:rPr lang="en-US" dirty="0" smtClean="0"/>
-              <a:t>break </a:t>
-            </a:r>
-            <a:r>
-              <a:rPr lang="en-US" dirty="0" smtClean="0"/>
-              <a:t>11:00 </a:t>
-            </a:r>
-            <a:r>
-              <a:rPr lang="en-US" dirty="0" smtClean="0"/>
-              <a:t>to 11</a:t>
-            </a:r>
-            <a:r>
-              <a:rPr lang="en-US" dirty="0" smtClean="0"/>
-              <a:t>:</a:t>
-            </a:r>
-            <a:r>
-              <a:rPr lang="en-US" dirty="0" smtClean="0"/>
-              <a:t>00</a:t>
-            </a:r>
-            <a:endParaRPr lang="en-US" dirty="0" smtClean="0"/>
+              <a:t>Tea break 11:00 to 11:00</a:t>
+            </a:r>
           </a:p>
           <a:p>
             <a:r>
               <a:rPr lang="en-US" b="1" dirty="0" smtClean="0"/>
-              <a:t>Second Session from 11:</a:t>
-            </a:r>
+              <a:t>Second Session from 11:30 to 13:00</a:t>
+            </a:r>
+          </a:p>
+          <a:p>
+            <a:pPr lvl="1"/>
+            <a:r>
+              <a:rPr lang="en-US" dirty="0" smtClean="0"/>
+              <a:t>Lunch from 13:00 to 14:00</a:t>
+            </a:r>
+          </a:p>
+          <a:p>
             <a:r>
               <a:rPr lang="en-US" b="1" dirty="0" smtClean="0"/>
-              <a:t>30 </a:t>
-            </a:r>
+              <a:t>Third Session-  from 14:00 to 16:00</a:t>
+            </a:r>
+          </a:p>
+          <a:p>
+            <a:pPr lvl="1"/>
+            <a:r>
+              <a:rPr lang="en-US" dirty="0" smtClean="0"/>
+              <a:t>Tea break – 16:00 to 16:30</a:t>
+            </a:r>
+          </a:p>
+          <a:p>
             <a:r>
               <a:rPr lang="en-US" b="1" dirty="0" smtClean="0"/>
-              <a:t>to </a:t>
-            </a:r>
-            <a:r>
-              <a:rPr lang="en-US" b="1" dirty="0" smtClean="0"/>
-              <a:t>13:00</a:t>
-            </a:r>
-            <a:endParaRPr lang="en-US" b="1" dirty="0" smtClean="0"/>
+              <a:t>Fourth Session – 16:30 to 18:00</a:t>
+            </a:r>
           </a:p>
           <a:p>
             <a:pPr lvl="1"/>
             <a:r>
               <a:rPr lang="en-US" dirty="0" smtClean="0"/>
-              <a:t>Lunch from </a:t>
-            </a:r>
-            <a:r>
-              <a:rPr lang="en-US" dirty="0" smtClean="0"/>
-              <a:t>13:00 </a:t>
-            </a:r>
-            <a:r>
-              <a:rPr lang="en-US" dirty="0" smtClean="0"/>
-              <a:t>to </a:t>
-            </a:r>
-            <a:r>
-              <a:rPr lang="en-US" dirty="0" smtClean="0"/>
-              <a:t>14:00</a:t>
-            </a:r>
-            <a:endParaRPr lang="en-US" dirty="0" smtClean="0"/>
-          </a:p>
-          <a:p>
-            <a:r>
-              <a:rPr lang="en-US" b="1" dirty="0" smtClean="0"/>
-              <a:t>Third Session-  from </a:t>
-            </a:r>
-            <a:r>
-              <a:rPr lang="en-US" b="1" dirty="0" smtClean="0"/>
-              <a:t>14:00</a:t>
-            </a:r>
-            <a:r>
-              <a:rPr lang="en-US" b="1" dirty="0" smtClean="0"/>
-              <a:t> </a:t>
-            </a:r>
-            <a:r>
-              <a:rPr lang="en-US" b="1" dirty="0" smtClean="0"/>
-              <a:t>to </a:t>
-            </a:r>
-            <a:r>
-              <a:rPr lang="en-US" b="1" dirty="0" smtClean="0"/>
-              <a:t>16:00</a:t>
-            </a:r>
-            <a:endParaRPr lang="en-US" b="1" dirty="0" smtClean="0"/>
-          </a:p>
-          <a:p>
-            <a:pPr lvl="1"/>
-            <a:r>
-              <a:rPr lang="en-US" dirty="0" smtClean="0"/>
-              <a:t>Tea break – </a:t>
-            </a:r>
-            <a:r>
-              <a:rPr lang="en-US" dirty="0" smtClean="0"/>
-              <a:t>16:00</a:t>
-            </a:r>
-            <a:r>
-              <a:rPr lang="en-US" dirty="0" smtClean="0"/>
-              <a:t> </a:t>
-            </a:r>
-            <a:r>
-              <a:rPr lang="en-US" dirty="0" smtClean="0"/>
-              <a:t>to </a:t>
-            </a:r>
-            <a:r>
-              <a:rPr lang="en-US" dirty="0" smtClean="0"/>
-              <a:t>16:30</a:t>
-            </a:r>
-            <a:endParaRPr lang="en-US" dirty="0" smtClean="0"/>
-          </a:p>
-          <a:p>
-            <a:r>
-              <a:rPr lang="en-US" b="1" dirty="0" smtClean="0"/>
-              <a:t>Fourth Session – </a:t>
-            </a:r>
-            <a:r>
-              <a:rPr lang="en-US" b="1" dirty="0" smtClean="0"/>
-              <a:t>16:30 </a:t>
-            </a:r>
-            <a:r>
-              <a:rPr lang="en-US" b="1" dirty="0" smtClean="0"/>
-              <a:t>to </a:t>
-            </a:r>
-            <a:r>
-              <a:rPr lang="en-US" b="1" dirty="0" smtClean="0"/>
-              <a:t>18:00</a:t>
-            </a:r>
-          </a:p>
-          <a:p>
-            <a:pPr lvl="1"/>
-            <a:r>
-              <a:rPr lang="en-US" dirty="0" smtClean="0"/>
               <a:t>Dinner</a:t>
             </a:r>
-            <a:endParaRPr lang="en-US" dirty="0" smtClean="0"/>
           </a:p>
           <a:p>
             <a:r>
@@ -8597,11 +8427,19 @@
             </a:r>
             <a:r>
               <a:rPr lang="en-US" b="1" dirty="0" err="1" smtClean="0"/>
-              <a:t>Metcourt</a:t>
+              <a:t>Boma</a:t>
             </a:r>
             <a:r>
               <a:rPr lang="en-US" b="1" dirty="0" smtClean="0"/>
-              <a:t> Hotel</a:t>
+              <a:t> Hotel or </a:t>
+            </a:r>
+            <a:r>
+              <a:rPr lang="en-US" b="1" dirty="0" err="1" smtClean="0"/>
+              <a:t>Boma</a:t>
+            </a:r>
+            <a:r>
+              <a:rPr lang="en-US" b="1" dirty="0" smtClean="0"/>
+              <a:t> Inn</a:t>
             </a:r>
             <a:endParaRPr lang="en-US" b="1" dirty="0" smtClean="0"/>
           </a:p>
@@ -8615,93 +8453,40 @@
             </a:r>
             <a:r>
               <a:rPr lang="en-US" dirty="0" smtClean="0"/>
-              <a:t>unch </a:t>
-            </a:r>
-            <a:r>
-              <a:rPr lang="en-US" dirty="0" smtClean="0"/>
-              <a:t>and </a:t>
-            </a:r>
-            <a:r>
-              <a:rPr lang="en-US" dirty="0" smtClean="0"/>
-              <a:t>dinner: </a:t>
+              <a:t>unch and dinner: </a:t>
             </a:r>
             <a:r>
               <a:rPr lang="en-US" b="1" dirty="0" smtClean="0"/>
-              <a:t>At </a:t>
+              <a:t>On the ground floor of the conference facility</a:t>
+            </a:r>
+            <a:endParaRPr lang="en-US" b="1" dirty="0" smtClean="0"/>
+          </a:p>
+          <a:p>
+            <a:pPr marL="0" indent="0">
+              <a:buNone/>
+            </a:pPr>
+            <a:r>
+              <a:rPr lang="en-US" dirty="0" smtClean="0"/>
+              <a:t>Tea break: </a:t>
             </a:r>
             <a:r>
               <a:rPr lang="en-US" b="1" dirty="0" smtClean="0"/>
-              <a:t>the </a:t>
+              <a:t>In the corridor outside the lecture rooms</a:t>
+            </a:r>
+            <a:endParaRPr lang="en-US" b="1" dirty="0" smtClean="0"/>
+          </a:p>
+          <a:p>
+            <a:pPr marL="0" indent="0">
+              <a:buNone/>
+            </a:pPr>
+            <a:r>
+              <a:rPr lang="en-US" dirty="0" smtClean="0"/>
+              <a:t>Washrooms:  </a:t>
             </a:r>
             <a:r>
               <a:rPr lang="en-US" b="1" dirty="0" smtClean="0"/>
-              <a:t>Marquee (on left side of the exit from GICC)</a:t>
-            </a:r>
-            <a:endParaRPr lang="en-US" b="1" dirty="0" smtClean="0"/>
-          </a:p>
-          <a:p>
-            <a:pPr marL="0" indent="0">
-              <a:buNone/>
-            </a:pPr>
-            <a:r>
-              <a:rPr lang="en-US" dirty="0" smtClean="0"/>
-              <a:t>Tea </a:t>
-            </a:r>
-            <a:r>
-              <a:rPr lang="en-US" dirty="0" smtClean="0"/>
-              <a:t>break: </a:t>
-            </a:r>
-            <a:r>
-              <a:rPr lang="en-US" b="1" dirty="0" smtClean="0"/>
-              <a:t>At the foyer area next to the main entrance</a:t>
-            </a:r>
-          </a:p>
-          <a:p>
-            <a:pPr marL="0" indent="0">
-              <a:buNone/>
-            </a:pPr>
-            <a:r>
-              <a:rPr lang="en-US" dirty="0" smtClean="0"/>
-              <a:t>Washrooms:  </a:t>
-            </a:r>
-            <a:r>
-              <a:rPr lang="en-US" b="1" dirty="0" smtClean="0"/>
-              <a:t>At the right of foyer area and 2</a:t>
-            </a:r>
-            <a:r>
-              <a:rPr lang="en-US" b="1" baseline="30000" dirty="0" smtClean="0"/>
-              <a:t>nd</a:t>
-            </a:r>
-            <a:r>
-              <a:rPr lang="en-US" b="1" dirty="0" smtClean="0"/>
-              <a:t> further along the corridor</a:t>
-            </a:r>
-          </a:p>
-          <a:p>
-            <a:pPr marL="0" indent="0" algn="ctr">
-              <a:buNone/>
-            </a:pPr>
-            <a:r>
-              <a:rPr lang="en-US" b="1" dirty="0" smtClean="0">
-                <a:solidFill>
-                  <a:srgbClr val="FF0000"/>
-                </a:solidFill>
-              </a:rPr>
-              <a:t>EXIT: USE DOOR ON RIGHT SIDE OF ROOM VIA SI-E CLASS BEAR IN MIND THAT THE OTHER TRACKS WILL BE IN SESSION </a:t>
-            </a:r>
-            <a:r>
-              <a:rPr lang="en-US" dirty="0" smtClean="0">
-                <a:solidFill>
-                  <a:srgbClr val="FF0000"/>
-                </a:solidFill>
-              </a:rPr>
-              <a:t> </a:t>
-            </a:r>
-            <a:endParaRPr lang="en-US" dirty="0" smtClean="0">
-              <a:solidFill>
-                <a:srgbClr val="FF0000"/>
-              </a:solidFill>
-            </a:endParaRPr>
+              <a:t>To the right when you exit from KIFARU (close to the secretariat)</a:t>
+            </a:r>
           </a:p>
         </p:txBody>
       </p:sp>
@@ -8718,7 +8503,7 @@
   <p:timing>
     <p:tnLst>
       <p:par>
-        <p:cTn xmlns:p14="http://schemas.microsoft.com/office/powerpoint/2010/main" id="1" dur="indefinite" restart="never" nodeType="tmRoot"/>
+        <p:cTn id="1" dur="indefinite" restart="never" nodeType="tmRoot"/>
       </p:par>
     </p:tnLst>
   </p:timing>
@@ -8884,7 +8669,7 @@
   <p:timing>
     <p:tnLst>
       <p:par>
-        <p:cTn xmlns:p14="http://schemas.microsoft.com/office/powerpoint/2010/main" id="1" dur="indefinite" restart="never" nodeType="tmRoot"/>
+        <p:cTn id="1" dur="indefinite" restart="never" nodeType="tmRoot"/>
       </p:par>
     </p:tnLst>
   </p:timing>
@@ -9002,19 +8787,7 @@
             </a:r>
             <a:r>
               <a:rPr lang="en-US" sz="2800" dirty="0" smtClean="0"/>
-              <a:t>network </a:t>
-            </a:r>
-            <a:r>
-              <a:rPr lang="en-US" sz="2800" dirty="0"/>
-              <a:t>if possible, otherwise </a:t>
-            </a:r>
-            <a:r>
-              <a:rPr lang="en-US" sz="2800" b="1" dirty="0"/>
-              <a:t>AIS-</a:t>
-            </a:r>
-            <a:r>
-              <a:rPr lang="en-US" sz="2800" b="1" dirty="0" err="1"/>
-              <a:t>bgn</a:t>
+              <a:t>or you course network SSID</a:t>
             </a:r>
             <a:endParaRPr lang="en-US" sz="2800" b="1" dirty="0"/>
           </a:p>
@@ -9079,7 +8852,7 @@
   <p:timing>
     <p:tnLst>
       <p:par>
-        <p:cTn xmlns:p14="http://schemas.microsoft.com/office/powerpoint/2010/main" id="1" dur="indefinite" restart="never" nodeType="tmRoot"/>
+        <p:cTn id="1" dur="indefinite" restart="never" nodeType="tmRoot"/>
       </p:par>
     </p:tnLst>
   </p:timing>
@@ -9199,7 +8972,6 @@
               <a:rPr lang="en-US" sz="2400" dirty="0" smtClean="0"/>
               <a:t>PC Assignment exercise</a:t>
             </a:r>
-            <a:endParaRPr lang="en-US" sz="2400" dirty="0" smtClean="0"/>
           </a:p>
           <a:p>
             <a:pPr lvl="0"/>
@@ -9213,7 +8985,11 @@
             </a:r>
             <a:r>
               <a:rPr lang="en-US" b="1" dirty="0" smtClean="0"/>
-              <a:t>8.0.0 OS </a:t>
+              <a:t>8.8 </a:t>
+            </a:r>
+            <a:r>
+              <a:rPr lang="en-US" b="1" dirty="0" smtClean="0"/>
+              <a:t>OS </a:t>
             </a:r>
             <a:r>
               <a:rPr lang="en-US" b="1" dirty="0"/>
@@ -9308,7 +9084,7 @@
   <p:timing>
     <p:tnLst>
       <p:par>
-        <p:cTn xmlns:p14="http://schemas.microsoft.com/office/powerpoint/2010/main" id="1" dur="indefinite" restart="never" nodeType="tmRoot"/>
+        <p:cTn id="1" dur="indefinite" restart="never" nodeType="tmRoot"/>
       </p:par>
     </p:tnLst>
   </p:timing>

</xml_diff>